<commit_message>
update video 006 R Packages
</commit_message>
<xml_diff>
--- a/RinAction/R_in_Action.pptx
+++ b/RinAction/R_in_Action.pptx
@@ -42010,8 +42010,8 @@
         </p:blipFill>
         <p:spPr>
           <a:xfrm>
-            <a:off x="760602" y="1914724"/>
-            <a:ext cx="5918105" cy="3797612"/>
+            <a:off x="1378956" y="2311518"/>
+            <a:ext cx="5299751" cy="3400818"/>
           </a:xfrm>
           <a:prstGeom prst="rect">
             <a:avLst/>
@@ -42060,7 +42060,22 @@
                 <a:ea typeface="ADLaM Display" panose="02010000000000000000" pitchFamily="2" charset="0"/>
                 <a:cs typeface="ADLaM Display" panose="02010000000000000000" pitchFamily="2" charset="0"/>
               </a:rPr>
-              <a:t>006 – </a:t>
+              <a:t>006 </a:t>
+            </a:r>
+            <a:br>
+              <a:rPr lang="en-US" dirty="0">
+                <a:latin typeface="ADLaM Display" panose="02010000000000000000" pitchFamily="2" charset="0"/>
+                <a:ea typeface="ADLaM Display" panose="02010000000000000000" pitchFamily="2" charset="0"/>
+                <a:cs typeface="ADLaM Display" panose="02010000000000000000" pitchFamily="2" charset="0"/>
+              </a:rPr>
+            </a:br>
+            <a:r>
+              <a:rPr lang="en-US" dirty="0">
+                <a:latin typeface="ADLaM Display" panose="02010000000000000000" pitchFamily="2" charset="0"/>
+                <a:ea typeface="ADLaM Display" panose="02010000000000000000" pitchFamily="2" charset="0"/>
+                <a:cs typeface="ADLaM Display" panose="02010000000000000000" pitchFamily="2" charset="0"/>
+              </a:rPr>
+              <a:t>– </a:t>
             </a:r>
             <a:r>
               <a:rPr lang="zh-CN" altLang="en-US" dirty="0">
@@ -42289,7 +42304,7 @@
         <p:spPr>
           <a:xfrm>
             <a:off x="692613" y="1360089"/>
-            <a:ext cx="5986094" cy="554635"/>
+            <a:ext cx="5986094" cy="826811"/>
           </a:xfrm>
           <a:prstGeom prst="rect">
             <a:avLst/>
@@ -42320,7 +42335,7 @@
           </a:lstStyle>
           <a:p>
             <a:r>
-              <a:rPr lang="en-US" sz="2800" dirty="0">
+              <a:rPr lang="en-US" sz="4400" dirty="0">
                 <a:latin typeface="华文隶书" panose="02010800040101010101" pitchFamily="2" charset="-122"/>
                 <a:ea typeface="华文隶书" panose="02010800040101010101" pitchFamily="2" charset="-122"/>
                 <a:cs typeface="ADLaM Display" panose="02010000000000000000" pitchFamily="2" charset="0"/>
@@ -42328,7 +42343,7 @@
               <a:t>R</a:t>
             </a:r>
             <a:r>
-              <a:rPr lang="zh-CN" altLang="en-US" sz="2800" dirty="0">
+              <a:rPr lang="zh-CN" altLang="en-US" sz="4400" dirty="0">
                 <a:latin typeface="华文隶书" panose="02010800040101010101" pitchFamily="2" charset="-122"/>
                 <a:ea typeface="华文隶书" panose="02010800040101010101" pitchFamily="2" charset="-122"/>
                 <a:cs typeface="ADLaM Display" panose="02010000000000000000" pitchFamily="2" charset="0"/>
@@ -42336,7 +42351,7 @@
               <a:t>的包（</a:t>
             </a:r>
             <a:r>
-              <a:rPr lang="en-US" altLang="zh-CN" sz="2800" dirty="0">
+              <a:rPr lang="en-US" altLang="zh-CN" sz="4400" dirty="0">
                 <a:latin typeface="华文隶书" panose="02010800040101010101" pitchFamily="2" charset="-122"/>
                 <a:ea typeface="华文隶书" panose="02010800040101010101" pitchFamily="2" charset="-122"/>
                 <a:cs typeface="ADLaM Display" panose="02010000000000000000" pitchFamily="2" charset="0"/>
@@ -42344,14 +42359,14 @@
               <a:t>Packages</a:t>
             </a:r>
             <a:r>
-              <a:rPr lang="zh-CN" altLang="en-US" sz="2800" dirty="0">
+              <a:rPr lang="zh-CN" altLang="en-US" sz="4400" dirty="0">
                 <a:latin typeface="华文隶书" panose="02010800040101010101" pitchFamily="2" charset="-122"/>
                 <a:ea typeface="华文隶书" panose="02010800040101010101" pitchFamily="2" charset="-122"/>
                 <a:cs typeface="ADLaM Display" panose="02010000000000000000" pitchFamily="2" charset="0"/>
               </a:rPr>
               <a:t>）</a:t>
             </a:r>
-            <a:endParaRPr lang="en-US" sz="2800" dirty="0">
+            <a:endParaRPr lang="en-US" sz="4400" dirty="0">
               <a:latin typeface="华文隶书" panose="02010800040101010101" pitchFamily="2" charset="-122"/>
               <a:ea typeface="华文隶书" panose="02010800040101010101" pitchFamily="2" charset="-122"/>
               <a:cs typeface="ADLaM Display" panose="02010000000000000000" pitchFamily="2" charset="0"/>

</xml_diff>

<commit_message>
add videos for chapter 2.2
</commit_message>
<xml_diff>
--- a/RinAction/R_in_Action.pptx
+++ b/RinAction/R_in_Action.pptx
@@ -5,10 +5,10 @@
     <p:sldMasterId id="2147483648" r:id="rId4"/>
   </p:sldMasterIdLst>
   <p:notesMasterIdLst>
-    <p:notesMasterId r:id="rId13"/>
+    <p:notesMasterId r:id="rId16"/>
   </p:notesMasterIdLst>
   <p:handoutMasterIdLst>
-    <p:handoutMasterId r:id="rId14"/>
+    <p:handoutMasterId r:id="rId17"/>
   </p:handoutMasterIdLst>
   <p:sldIdLst>
     <p:sldId id="272" r:id="rId5"/>
@@ -19,6 +19,9 @@
     <p:sldId id="277" r:id="rId10"/>
     <p:sldId id="278" r:id="rId11"/>
     <p:sldId id="279" r:id="rId12"/>
+    <p:sldId id="280" r:id="rId13"/>
+    <p:sldId id="281" r:id="rId14"/>
+    <p:sldId id="282" r:id="rId15"/>
   </p:sldIdLst>
   <p:sldSz cx="12192000" cy="6858000"/>
   <p:notesSz cx="6858000" cy="9144000"/>
@@ -259,7 +262,7 @@
           <a:p>
             <a:fld id="{FD913024-4032-4B4F-8680-09D5E08EDB6E}" type="datetimeFigureOut">
               <a:rPr lang="en-US" smtClean="0"/>
-              <a:t>12/20/2023</a:t>
+              <a:t>3/6/2024</a:t>
             </a:fld>
             <a:endParaRPr lang="en-US" dirty="0"/>
           </a:p>
@@ -436,7 +439,7 @@
           <a:p>
             <a:fld id="{F2AE225E-43E0-7047-8ADB-DD9EBB41B4D0}" type="datetimeFigureOut">
               <a:rPr lang="en-US" noProof="0" smtClean="0"/>
-              <a:t>12/20/2023</a:t>
+              <a:t>3/6/2024</a:t>
             </a:fld>
             <a:endParaRPr lang="en-US" noProof="0" dirty="0"/>
           </a:p>
@@ -40474,6 +40477,862 @@
     <p:extLst>
       <p:ext uri="{BB962C8B-B14F-4D97-AF65-F5344CB8AC3E}">
         <p14:creationId xmlns:p14="http://schemas.microsoft.com/office/powerpoint/2010/main" val="417536504"/>
+      </p:ext>
+    </p:extLst>
+  </p:cSld>
+  <p:clrMapOvr>
+    <a:masterClrMapping/>
+  </p:clrMapOvr>
+</p:sld>
+</file>
+
+<file path=ppt/slides/slide10.xml><?xml version="1.0" encoding="utf-8"?>
+<p:sld xmlns:a="http://schemas.openxmlformats.org/drawingml/2006/main" xmlns:r="http://schemas.openxmlformats.org/officeDocument/2006/relationships" xmlns:p="http://schemas.openxmlformats.org/presentationml/2006/main">
+  <p:cSld>
+    <p:spTree>
+      <p:nvGrpSpPr>
+        <p:cNvPr id="1" name="">
+          <a:extLst>
+            <a:ext uri="{FF2B5EF4-FFF2-40B4-BE49-F238E27FC236}">
+              <a16:creationId xmlns:a16="http://schemas.microsoft.com/office/drawing/2014/main" id="{9E91D6D4-C2F7-54D8-58F9-7B1D4A1AF3FA}"/>
+            </a:ext>
+          </a:extLst>
+        </p:cNvPr>
+        <p:cNvGrpSpPr/>
+        <p:nvPr/>
+      </p:nvGrpSpPr>
+      <p:grpSpPr>
+        <a:xfrm>
+          <a:off x="0" y="0"/>
+          <a:ext cx="0" cy="0"/>
+          <a:chOff x="0" y="0"/>
+          <a:chExt cx="0" cy="0"/>
+        </a:xfrm>
+      </p:grpSpPr>
+      <p:sp>
+        <p:nvSpPr>
+          <p:cNvPr id="4" name="Title 3">
+            <a:extLst>
+              <a:ext uri="{FF2B5EF4-FFF2-40B4-BE49-F238E27FC236}">
+                <a16:creationId xmlns:a16="http://schemas.microsoft.com/office/drawing/2014/main" id="{30C4A52D-F7C4-78A3-35AC-CD1638B0CA69}"/>
+              </a:ext>
+            </a:extLst>
+          </p:cNvPr>
+          <p:cNvSpPr>
+            <a:spLocks noGrp="1"/>
+          </p:cNvSpPr>
+          <p:nvPr>
+            <p:ph type="title"/>
+          </p:nvPr>
+        </p:nvSpPr>
+        <p:spPr>
+          <a:xfrm>
+            <a:off x="576071" y="775807"/>
+            <a:ext cx="6757058" cy="826811"/>
+          </a:xfrm>
+        </p:spPr>
+        <p:txBody>
+          <a:bodyPr/>
+          <a:lstStyle/>
+          <a:p>
+            <a:r>
+              <a:rPr lang="en-US" sz="6000" dirty="0">
+                <a:latin typeface="ADLaM Display" panose="02010000000000000000" pitchFamily="2" charset="0"/>
+                <a:ea typeface="ADLaM Display" panose="02010000000000000000" pitchFamily="2" charset="0"/>
+                <a:cs typeface="ADLaM Display" panose="02010000000000000000" pitchFamily="2" charset="0"/>
+              </a:rPr>
+              <a:t>010</a:t>
+            </a:r>
+            <a:r>
+              <a:rPr lang="en-US" dirty="0">
+                <a:latin typeface="ADLaM Display" panose="02010000000000000000" pitchFamily="2" charset="0"/>
+                <a:ea typeface="ADLaM Display" panose="02010000000000000000" pitchFamily="2" charset="0"/>
+                <a:cs typeface="ADLaM Display" panose="02010000000000000000" pitchFamily="2" charset="0"/>
+              </a:rPr>
+              <a:t> </a:t>
+            </a:r>
+            <a:br>
+              <a:rPr lang="en-US" dirty="0">
+                <a:latin typeface="ADLaM Display" panose="02010000000000000000" pitchFamily="2" charset="0"/>
+                <a:ea typeface="ADLaM Display" panose="02010000000000000000" pitchFamily="2" charset="0"/>
+                <a:cs typeface="ADLaM Display" panose="02010000000000000000" pitchFamily="2" charset="0"/>
+              </a:rPr>
+            </a:br>
+            <a:r>
+              <a:rPr lang="en-US" dirty="0">
+                <a:latin typeface="ADLaM Display" panose="02010000000000000000" pitchFamily="2" charset="0"/>
+                <a:ea typeface="ADLaM Display" panose="02010000000000000000" pitchFamily="2" charset="0"/>
+                <a:cs typeface="ADLaM Display" panose="02010000000000000000" pitchFamily="2" charset="0"/>
+              </a:rPr>
+              <a:t>2. </a:t>
+            </a:r>
+            <a:r>
+              <a:rPr lang="zh-CN" altLang="en-US" dirty="0">
+                <a:latin typeface="华文隶书" panose="02010800040101010101" pitchFamily="2" charset="-122"/>
+                <a:ea typeface="华文隶书" panose="02010800040101010101" pitchFamily="2" charset="-122"/>
+                <a:cs typeface="ADLaM Display" panose="02010000000000000000" pitchFamily="2" charset="0"/>
+              </a:rPr>
+              <a:t>创建数据集</a:t>
+            </a:r>
+            <a:endParaRPr lang="en-US" dirty="0">
+              <a:latin typeface="华文隶书" panose="02010800040101010101" pitchFamily="2" charset="-122"/>
+              <a:ea typeface="华文隶书" panose="02010800040101010101" pitchFamily="2" charset="-122"/>
+              <a:cs typeface="ADLaM Display" panose="02010000000000000000" pitchFamily="2" charset="0"/>
+            </a:endParaRPr>
+          </a:p>
+        </p:txBody>
+      </p:sp>
+      <p:pic>
+        <p:nvPicPr>
+          <p:cNvPr id="8" name="Picture Placeholder 7" descr="A book with a person in a garment">
+            <a:extLst>
+              <a:ext uri="{FF2B5EF4-FFF2-40B4-BE49-F238E27FC236}">
+                <a16:creationId xmlns:a16="http://schemas.microsoft.com/office/drawing/2014/main" id="{3D225C9F-72AB-461F-63F0-6E38E5128233}"/>
+              </a:ext>
+            </a:extLst>
+          </p:cNvPr>
+          <p:cNvPicPr>
+            <a:picLocks noGrp="1" noChangeAspect="1"/>
+          </p:cNvPicPr>
+          <p:nvPr>
+            <p:ph type="pic" idx="1"/>
+          </p:nvPr>
+        </p:nvPicPr>
+        <p:blipFill>
+          <a:blip r:embed="rId2"/>
+          <a:srcRect l="1435" r="1435"/>
+          <a:stretch>
+            <a:fillRect/>
+          </a:stretch>
+        </p:blipFill>
+        <p:spPr>
+          <a:xfrm>
+            <a:off x="1190009" y="2437460"/>
+            <a:ext cx="2276474" cy="3130501"/>
+          </a:xfrm>
+          <a:prstGeom prst="roundRect">
+            <a:avLst>
+              <a:gd name="adj" fmla="val 8594"/>
+            </a:avLst>
+          </a:prstGeom>
+          <a:solidFill>
+            <a:srgbClr val="FFFFFF">
+              <a:shade val="85000"/>
+            </a:srgbClr>
+          </a:solidFill>
+          <a:ln>
+            <a:noFill/>
+          </a:ln>
+          <a:effectLst>
+            <a:reflection blurRad="12700" stA="38000" endPos="28000" dist="5000" dir="5400000" sy="-100000" algn="bl" rotWithShape="0"/>
+          </a:effectLst>
+        </p:spPr>
+      </p:pic>
+      <p:sp>
+        <p:nvSpPr>
+          <p:cNvPr id="11" name="Title 1">
+            <a:extLst>
+              <a:ext uri="{FF2B5EF4-FFF2-40B4-BE49-F238E27FC236}">
+                <a16:creationId xmlns:a16="http://schemas.microsoft.com/office/drawing/2014/main" id="{E251CE3D-5476-9CFB-1A0B-1209CF55E3DC}"/>
+              </a:ext>
+            </a:extLst>
+          </p:cNvPr>
+          <p:cNvSpPr txBox="1">
+            <a:spLocks/>
+          </p:cNvSpPr>
+          <p:nvPr/>
+        </p:nvSpPr>
+        <p:spPr>
+          <a:xfrm>
+            <a:off x="7261412" y="0"/>
+            <a:ext cx="3551632" cy="1145663"/>
+          </a:xfrm>
+          <a:prstGeom prst="rect">
+            <a:avLst/>
+          </a:prstGeom>
+        </p:spPr>
+        <p:txBody>
+          <a:bodyPr vert="horz" lIns="91440" tIns="45720" rIns="91440" bIns="45720" rtlCol="0" anchor="b">
+            <a:noAutofit/>
+          </a:bodyPr>
+          <a:lstStyle>
+            <a:lvl1pPr algn="l" defTabSz="914400" rtl="0" eaLnBrk="1" latinLnBrk="0" hangingPunct="1">
+              <a:lnSpc>
+                <a:spcPct val="90000"/>
+              </a:lnSpc>
+              <a:spcBef>
+                <a:spcPct val="0"/>
+              </a:spcBef>
+              <a:buNone/>
+              <a:defRPr sz="4800" kern="1200">
+                <a:solidFill>
+                  <a:schemeClr val="tx1"/>
+                </a:solidFill>
+                <a:latin typeface="+mj-lt"/>
+                <a:ea typeface="+mj-ea"/>
+                <a:cs typeface="+mj-cs"/>
+              </a:defRPr>
+            </a:lvl1pPr>
+          </a:lstStyle>
+          <a:p>
+            <a:pPr algn="ctr"/>
+            <a:r>
+              <a:rPr lang="en-US" sz="4000" dirty="0">
+                <a:latin typeface="ADLaM Display" panose="02010000000000000000" pitchFamily="2" charset="0"/>
+                <a:ea typeface="ADLaM Display" panose="02010000000000000000" pitchFamily="2" charset="0"/>
+                <a:cs typeface="ADLaM Display" panose="02010000000000000000" pitchFamily="2" charset="0"/>
+              </a:rPr>
+              <a:t>R in Action</a:t>
+            </a:r>
+            <a:br>
+              <a:rPr lang="en-US" sz="4000" dirty="0"/>
+            </a:br>
+            <a:r>
+              <a:rPr lang="en-US" altLang="zh-CN" sz="4000" dirty="0"/>
+              <a:t>R</a:t>
+            </a:r>
+            <a:r>
+              <a:rPr lang="zh-CN" altLang="en-US" sz="4000" dirty="0">
+                <a:latin typeface="华文隶书" panose="02010800040101010101" pitchFamily="2" charset="-122"/>
+                <a:ea typeface="华文隶书" panose="02010800040101010101" pitchFamily="2" charset="-122"/>
+              </a:rPr>
+              <a:t>语言实战</a:t>
+            </a:r>
+            <a:endParaRPr lang="en-US" sz="4000" dirty="0">
+              <a:latin typeface="华文隶书" panose="02010800040101010101" pitchFamily="2" charset="-122"/>
+              <a:ea typeface="华文隶书" panose="02010800040101010101" pitchFamily="2" charset="-122"/>
+            </a:endParaRPr>
+          </a:p>
+        </p:txBody>
+      </p:sp>
+      <p:sp>
+        <p:nvSpPr>
+          <p:cNvPr id="13" name="TextBox 12">
+            <a:extLst>
+              <a:ext uri="{FF2B5EF4-FFF2-40B4-BE49-F238E27FC236}">
+                <a16:creationId xmlns:a16="http://schemas.microsoft.com/office/drawing/2014/main" id="{A97409E5-0F04-EFB5-7102-61E6909D5299}"/>
+              </a:ext>
+            </a:extLst>
+          </p:cNvPr>
+          <p:cNvSpPr txBox="1"/>
+          <p:nvPr/>
+        </p:nvSpPr>
+        <p:spPr>
+          <a:xfrm>
+            <a:off x="942109" y="5836954"/>
+            <a:ext cx="10510982" cy="954107"/>
+          </a:xfrm>
+          <a:prstGeom prst="rect">
+            <a:avLst/>
+          </a:prstGeom>
+          <a:noFill/>
+        </p:spPr>
+        <p:txBody>
+          <a:bodyPr wrap="square">
+            <a:spAutoFit/>
+          </a:bodyPr>
+          <a:lstStyle/>
+          <a:p>
+            <a:r>
+              <a:rPr lang="en-US" sz="2800" b="1" dirty="0"/>
+              <a:t>GitHub: </a:t>
+            </a:r>
+            <a:r>
+              <a:rPr lang="en-US" sz="2800" b="1" dirty="0">
+                <a:hlinkClick r:id="rId3"/>
+              </a:rPr>
+              <a:t>https://github.com/yasenstar/learn_r/tree/main/RinAction</a:t>
+            </a:r>
+            <a:endParaRPr lang="en-US" sz="2800" b="1" dirty="0"/>
+          </a:p>
+          <a:p>
+            <a:r>
+              <a:rPr lang="en-US" altLang="zh-CN" sz="2800" b="1" dirty="0"/>
+              <a:t>Gitee: </a:t>
+            </a:r>
+            <a:r>
+              <a:rPr lang="en-US" altLang="zh-CN" sz="2800" b="1" dirty="0">
+                <a:hlinkClick r:id="rId4"/>
+              </a:rPr>
+              <a:t>https://gitee.com/yasenstar/learn_r/tree/main/RinAction</a:t>
+            </a:r>
+            <a:endParaRPr lang="en-US" sz="2800" b="1" dirty="0"/>
+          </a:p>
+        </p:txBody>
+      </p:sp>
+      <p:sp>
+        <p:nvSpPr>
+          <p:cNvPr id="7" name="Title 1">
+            <a:extLst>
+              <a:ext uri="{FF2B5EF4-FFF2-40B4-BE49-F238E27FC236}">
+                <a16:creationId xmlns:a16="http://schemas.microsoft.com/office/drawing/2014/main" id="{FC526FD9-AFF0-862A-889E-8D1C3BBBF9AB}"/>
+              </a:ext>
+            </a:extLst>
+          </p:cNvPr>
+          <p:cNvSpPr txBox="1">
+            <a:spLocks/>
+          </p:cNvSpPr>
+          <p:nvPr/>
+        </p:nvSpPr>
+        <p:spPr>
+          <a:xfrm>
+            <a:off x="692613" y="1431809"/>
+            <a:ext cx="5986094" cy="826811"/>
+          </a:xfrm>
+          <a:prstGeom prst="rect">
+            <a:avLst/>
+          </a:prstGeom>
+        </p:spPr>
+        <p:txBody>
+          <a:bodyPr vert="horz" lIns="91440" tIns="45720" rIns="91440" bIns="45720" rtlCol="0" anchor="b">
+            <a:noAutofit/>
+          </a:bodyPr>
+          <a:lstStyle>
+            <a:lvl1pPr algn="l" defTabSz="914400" rtl="0" eaLnBrk="1" latinLnBrk="0" hangingPunct="1">
+              <a:lnSpc>
+                <a:spcPct val="90000"/>
+              </a:lnSpc>
+              <a:spcBef>
+                <a:spcPct val="0"/>
+              </a:spcBef>
+              <a:buNone/>
+              <a:defRPr sz="4800" kern="1200">
+                <a:solidFill>
+                  <a:schemeClr val="tx1"/>
+                </a:solidFill>
+                <a:latin typeface="+mj-lt"/>
+                <a:ea typeface="+mj-ea"/>
+                <a:cs typeface="+mj-cs"/>
+              </a:defRPr>
+            </a:lvl1pPr>
+          </a:lstStyle>
+          <a:p>
+            <a:r>
+              <a:rPr lang="en-US" altLang="zh-CN" sz="4400" dirty="0">
+                <a:latin typeface="华文隶书" panose="02010800040101010101" pitchFamily="2" charset="-122"/>
+                <a:ea typeface="华文隶书" panose="02010800040101010101" pitchFamily="2" charset="-122"/>
+                <a:cs typeface="ADLaM Display" panose="02010000000000000000" pitchFamily="2" charset="0"/>
+              </a:rPr>
+              <a:t>2.2.5 </a:t>
+            </a:r>
+            <a:r>
+              <a:rPr lang="zh-CN" altLang="en-US" sz="4400" dirty="0">
+                <a:latin typeface="华文隶书" panose="02010800040101010101" pitchFamily="2" charset="-122"/>
+                <a:ea typeface="华文隶书" panose="02010800040101010101" pitchFamily="2" charset="-122"/>
+                <a:cs typeface="ADLaM Display" panose="02010000000000000000" pitchFamily="2" charset="0"/>
+              </a:rPr>
+              <a:t>因子</a:t>
+            </a:r>
+            <a:endParaRPr lang="en-US" sz="4400" dirty="0">
+              <a:latin typeface="华文隶书" panose="02010800040101010101" pitchFamily="2" charset="-122"/>
+              <a:ea typeface="华文隶书" panose="02010800040101010101" pitchFamily="2" charset="-122"/>
+              <a:cs typeface="ADLaM Display" panose="02010000000000000000" pitchFamily="2" charset="0"/>
+            </a:endParaRPr>
+          </a:p>
+        </p:txBody>
+      </p:sp>
+      <p:pic>
+        <p:nvPicPr>
+          <p:cNvPr id="3" name="Picture 2">
+            <a:extLst>
+              <a:ext uri="{FF2B5EF4-FFF2-40B4-BE49-F238E27FC236}">
+                <a16:creationId xmlns:a16="http://schemas.microsoft.com/office/drawing/2014/main" id="{49DF2993-EC6F-8249-8CD7-7DBC215B20EB}"/>
+              </a:ext>
+            </a:extLst>
+          </p:cNvPr>
+          <p:cNvPicPr>
+            <a:picLocks noChangeAspect="1"/>
+          </p:cNvPicPr>
+          <p:nvPr/>
+        </p:nvPicPr>
+        <p:blipFill>
+          <a:blip r:embed="rId5"/>
+          <a:stretch>
+            <a:fillRect/>
+          </a:stretch>
+        </p:blipFill>
+        <p:spPr>
+          <a:xfrm>
+            <a:off x="4598894" y="1194136"/>
+            <a:ext cx="7098979" cy="4469727"/>
+          </a:xfrm>
+          <a:prstGeom prst="rect">
+            <a:avLst/>
+          </a:prstGeom>
+          <a:ln>
+            <a:noFill/>
+          </a:ln>
+          <a:effectLst>
+            <a:outerShdw blurRad="292100" dist="139700" dir="2700000" algn="tl" rotWithShape="0">
+              <a:srgbClr val="333333">
+                <a:alpha val="65000"/>
+              </a:srgbClr>
+            </a:outerShdw>
+          </a:effectLst>
+        </p:spPr>
+      </p:pic>
+    </p:spTree>
+    <p:extLst>
+      <p:ext uri="{BB962C8B-B14F-4D97-AF65-F5344CB8AC3E}">
+        <p14:creationId xmlns:p14="http://schemas.microsoft.com/office/powerpoint/2010/main" val="1346621884"/>
+      </p:ext>
+    </p:extLst>
+  </p:cSld>
+  <p:clrMapOvr>
+    <a:masterClrMapping/>
+  </p:clrMapOvr>
+</p:sld>
+</file>
+
+<file path=ppt/slides/slide11.xml><?xml version="1.0" encoding="utf-8"?>
+<p:sld xmlns:a="http://schemas.openxmlformats.org/drawingml/2006/main" xmlns:r="http://schemas.openxmlformats.org/officeDocument/2006/relationships" xmlns:p="http://schemas.openxmlformats.org/presentationml/2006/main">
+  <p:cSld>
+    <p:spTree>
+      <p:nvGrpSpPr>
+        <p:cNvPr id="1" name="">
+          <a:extLst>
+            <a:ext uri="{FF2B5EF4-FFF2-40B4-BE49-F238E27FC236}">
+              <a16:creationId xmlns:a16="http://schemas.microsoft.com/office/drawing/2014/main" id="{36F5463D-F819-2146-07DA-BF90CEF92E2C}"/>
+            </a:ext>
+          </a:extLst>
+        </p:cNvPr>
+        <p:cNvGrpSpPr/>
+        <p:nvPr/>
+      </p:nvGrpSpPr>
+      <p:grpSpPr>
+        <a:xfrm>
+          <a:off x="0" y="0"/>
+          <a:ext cx="0" cy="0"/>
+          <a:chOff x="0" y="0"/>
+          <a:chExt cx="0" cy="0"/>
+        </a:xfrm>
+      </p:grpSpPr>
+      <p:sp>
+        <p:nvSpPr>
+          <p:cNvPr id="4" name="Title 3">
+            <a:extLst>
+              <a:ext uri="{FF2B5EF4-FFF2-40B4-BE49-F238E27FC236}">
+                <a16:creationId xmlns:a16="http://schemas.microsoft.com/office/drawing/2014/main" id="{537C2A13-D4EC-5685-5579-542A4472A948}"/>
+              </a:ext>
+            </a:extLst>
+          </p:cNvPr>
+          <p:cNvSpPr>
+            <a:spLocks noGrp="1"/>
+          </p:cNvSpPr>
+          <p:nvPr>
+            <p:ph type="title"/>
+          </p:nvPr>
+        </p:nvSpPr>
+        <p:spPr>
+          <a:xfrm>
+            <a:off x="576071" y="775807"/>
+            <a:ext cx="6757058" cy="826811"/>
+          </a:xfrm>
+        </p:spPr>
+        <p:txBody>
+          <a:bodyPr/>
+          <a:lstStyle/>
+          <a:p>
+            <a:r>
+              <a:rPr lang="en-US" sz="6000" dirty="0">
+                <a:latin typeface="ADLaM Display" panose="02010000000000000000" pitchFamily="2" charset="0"/>
+                <a:ea typeface="ADLaM Display" panose="02010000000000000000" pitchFamily="2" charset="0"/>
+                <a:cs typeface="ADLaM Display" panose="02010000000000000000" pitchFamily="2" charset="0"/>
+              </a:rPr>
+              <a:t>011</a:t>
+            </a:r>
+            <a:r>
+              <a:rPr lang="en-US" dirty="0">
+                <a:latin typeface="ADLaM Display" panose="02010000000000000000" pitchFamily="2" charset="0"/>
+                <a:ea typeface="ADLaM Display" panose="02010000000000000000" pitchFamily="2" charset="0"/>
+                <a:cs typeface="ADLaM Display" panose="02010000000000000000" pitchFamily="2" charset="0"/>
+              </a:rPr>
+              <a:t> </a:t>
+            </a:r>
+            <a:br>
+              <a:rPr lang="en-US" dirty="0">
+                <a:latin typeface="ADLaM Display" panose="02010000000000000000" pitchFamily="2" charset="0"/>
+                <a:ea typeface="ADLaM Display" panose="02010000000000000000" pitchFamily="2" charset="0"/>
+                <a:cs typeface="ADLaM Display" panose="02010000000000000000" pitchFamily="2" charset="0"/>
+              </a:rPr>
+            </a:br>
+            <a:r>
+              <a:rPr lang="en-US" dirty="0">
+                <a:latin typeface="ADLaM Display" panose="02010000000000000000" pitchFamily="2" charset="0"/>
+                <a:ea typeface="ADLaM Display" panose="02010000000000000000" pitchFamily="2" charset="0"/>
+                <a:cs typeface="ADLaM Display" panose="02010000000000000000" pitchFamily="2" charset="0"/>
+              </a:rPr>
+              <a:t>2. </a:t>
+            </a:r>
+            <a:r>
+              <a:rPr lang="zh-CN" altLang="en-US" dirty="0">
+                <a:latin typeface="华文隶书" panose="02010800040101010101" pitchFamily="2" charset="-122"/>
+                <a:ea typeface="华文隶书" panose="02010800040101010101" pitchFamily="2" charset="-122"/>
+                <a:cs typeface="ADLaM Display" panose="02010000000000000000" pitchFamily="2" charset="0"/>
+              </a:rPr>
+              <a:t>创建数据集</a:t>
+            </a:r>
+            <a:endParaRPr lang="en-US" dirty="0">
+              <a:latin typeface="华文隶书" panose="02010800040101010101" pitchFamily="2" charset="-122"/>
+              <a:ea typeface="华文隶书" panose="02010800040101010101" pitchFamily="2" charset="-122"/>
+              <a:cs typeface="ADLaM Display" panose="02010000000000000000" pitchFamily="2" charset="0"/>
+            </a:endParaRPr>
+          </a:p>
+        </p:txBody>
+      </p:sp>
+      <p:pic>
+        <p:nvPicPr>
+          <p:cNvPr id="8" name="Picture Placeholder 7" descr="A book with a person in a garment">
+            <a:extLst>
+              <a:ext uri="{FF2B5EF4-FFF2-40B4-BE49-F238E27FC236}">
+                <a16:creationId xmlns:a16="http://schemas.microsoft.com/office/drawing/2014/main" id="{8868A5A2-C818-44BE-4899-3B20E8F4202D}"/>
+              </a:ext>
+            </a:extLst>
+          </p:cNvPr>
+          <p:cNvPicPr>
+            <a:picLocks noGrp="1" noChangeAspect="1"/>
+          </p:cNvPicPr>
+          <p:nvPr>
+            <p:ph type="pic" idx="1"/>
+          </p:nvPr>
+        </p:nvPicPr>
+        <p:blipFill>
+          <a:blip r:embed="rId2"/>
+          <a:srcRect l="1435" r="1435"/>
+          <a:stretch>
+            <a:fillRect/>
+          </a:stretch>
+        </p:blipFill>
+        <p:spPr>
+          <a:xfrm>
+            <a:off x="1190009" y="2437460"/>
+            <a:ext cx="2276474" cy="3130501"/>
+          </a:xfrm>
+          <a:prstGeom prst="roundRect">
+            <a:avLst>
+              <a:gd name="adj" fmla="val 8594"/>
+            </a:avLst>
+          </a:prstGeom>
+          <a:solidFill>
+            <a:srgbClr val="FFFFFF">
+              <a:shade val="85000"/>
+            </a:srgbClr>
+          </a:solidFill>
+          <a:ln>
+            <a:noFill/>
+          </a:ln>
+          <a:effectLst>
+            <a:reflection blurRad="12700" stA="38000" endPos="28000" dist="5000" dir="5400000" sy="-100000" algn="bl" rotWithShape="0"/>
+          </a:effectLst>
+        </p:spPr>
+      </p:pic>
+      <p:sp>
+        <p:nvSpPr>
+          <p:cNvPr id="11" name="Title 1">
+            <a:extLst>
+              <a:ext uri="{FF2B5EF4-FFF2-40B4-BE49-F238E27FC236}">
+                <a16:creationId xmlns:a16="http://schemas.microsoft.com/office/drawing/2014/main" id="{E7F94570-801A-F10B-AA64-C574168594DE}"/>
+              </a:ext>
+            </a:extLst>
+          </p:cNvPr>
+          <p:cNvSpPr txBox="1">
+            <a:spLocks/>
+          </p:cNvSpPr>
+          <p:nvPr/>
+        </p:nvSpPr>
+        <p:spPr>
+          <a:xfrm>
+            <a:off x="7261412" y="0"/>
+            <a:ext cx="3551632" cy="1145663"/>
+          </a:xfrm>
+          <a:prstGeom prst="rect">
+            <a:avLst/>
+          </a:prstGeom>
+        </p:spPr>
+        <p:txBody>
+          <a:bodyPr vert="horz" lIns="91440" tIns="45720" rIns="91440" bIns="45720" rtlCol="0" anchor="b">
+            <a:noAutofit/>
+          </a:bodyPr>
+          <a:lstStyle>
+            <a:lvl1pPr algn="l" defTabSz="914400" rtl="0" eaLnBrk="1" latinLnBrk="0" hangingPunct="1">
+              <a:lnSpc>
+                <a:spcPct val="90000"/>
+              </a:lnSpc>
+              <a:spcBef>
+                <a:spcPct val="0"/>
+              </a:spcBef>
+              <a:buNone/>
+              <a:defRPr sz="4800" kern="1200">
+                <a:solidFill>
+                  <a:schemeClr val="tx1"/>
+                </a:solidFill>
+                <a:latin typeface="+mj-lt"/>
+                <a:ea typeface="+mj-ea"/>
+                <a:cs typeface="+mj-cs"/>
+              </a:defRPr>
+            </a:lvl1pPr>
+          </a:lstStyle>
+          <a:p>
+            <a:pPr algn="ctr"/>
+            <a:r>
+              <a:rPr lang="en-US" sz="4000" dirty="0">
+                <a:latin typeface="ADLaM Display" panose="02010000000000000000" pitchFamily="2" charset="0"/>
+                <a:ea typeface="ADLaM Display" panose="02010000000000000000" pitchFamily="2" charset="0"/>
+                <a:cs typeface="ADLaM Display" panose="02010000000000000000" pitchFamily="2" charset="0"/>
+              </a:rPr>
+              <a:t>R in Action</a:t>
+            </a:r>
+            <a:br>
+              <a:rPr lang="en-US" sz="4000" dirty="0"/>
+            </a:br>
+            <a:r>
+              <a:rPr lang="en-US" altLang="zh-CN" sz="4000" dirty="0"/>
+              <a:t>R</a:t>
+            </a:r>
+            <a:r>
+              <a:rPr lang="zh-CN" altLang="en-US" sz="4000" dirty="0">
+                <a:latin typeface="华文隶书" panose="02010800040101010101" pitchFamily="2" charset="-122"/>
+                <a:ea typeface="华文隶书" panose="02010800040101010101" pitchFamily="2" charset="-122"/>
+              </a:rPr>
+              <a:t>语言实战</a:t>
+            </a:r>
+            <a:endParaRPr lang="en-US" sz="4000" dirty="0">
+              <a:latin typeface="华文隶书" panose="02010800040101010101" pitchFamily="2" charset="-122"/>
+              <a:ea typeface="华文隶书" panose="02010800040101010101" pitchFamily="2" charset="-122"/>
+            </a:endParaRPr>
+          </a:p>
+        </p:txBody>
+      </p:sp>
+      <p:sp>
+        <p:nvSpPr>
+          <p:cNvPr id="13" name="TextBox 12">
+            <a:extLst>
+              <a:ext uri="{FF2B5EF4-FFF2-40B4-BE49-F238E27FC236}">
+                <a16:creationId xmlns:a16="http://schemas.microsoft.com/office/drawing/2014/main" id="{4384D35D-73C6-588C-BEB5-64FBFF1932F8}"/>
+              </a:ext>
+            </a:extLst>
+          </p:cNvPr>
+          <p:cNvSpPr txBox="1"/>
+          <p:nvPr/>
+        </p:nvSpPr>
+        <p:spPr>
+          <a:xfrm>
+            <a:off x="942109" y="5836954"/>
+            <a:ext cx="10510982" cy="954107"/>
+          </a:xfrm>
+          <a:prstGeom prst="rect">
+            <a:avLst/>
+          </a:prstGeom>
+          <a:noFill/>
+        </p:spPr>
+        <p:txBody>
+          <a:bodyPr wrap="square">
+            <a:spAutoFit/>
+          </a:bodyPr>
+          <a:lstStyle/>
+          <a:p>
+            <a:r>
+              <a:rPr lang="en-US" sz="2800" b="1" dirty="0"/>
+              <a:t>GitHub: </a:t>
+            </a:r>
+            <a:r>
+              <a:rPr lang="en-US" sz="2800" b="1" dirty="0">
+                <a:hlinkClick r:id="rId3"/>
+              </a:rPr>
+              <a:t>https://github.com/yasenstar/learn_r/tree/main/RinAction</a:t>
+            </a:r>
+            <a:endParaRPr lang="en-US" sz="2800" b="1" dirty="0"/>
+          </a:p>
+          <a:p>
+            <a:r>
+              <a:rPr lang="en-US" altLang="zh-CN" sz="2800" b="1" dirty="0"/>
+              <a:t>Gitee: </a:t>
+            </a:r>
+            <a:r>
+              <a:rPr lang="en-US" altLang="zh-CN" sz="2800" b="1" dirty="0">
+                <a:hlinkClick r:id="rId4"/>
+              </a:rPr>
+              <a:t>https://gitee.com/yasenstar/learn_r/tree/main/RinAction</a:t>
+            </a:r>
+            <a:endParaRPr lang="en-US" sz="2800" b="1" dirty="0"/>
+          </a:p>
+        </p:txBody>
+      </p:sp>
+      <p:sp>
+        <p:nvSpPr>
+          <p:cNvPr id="7" name="Title 1">
+            <a:extLst>
+              <a:ext uri="{FF2B5EF4-FFF2-40B4-BE49-F238E27FC236}">
+                <a16:creationId xmlns:a16="http://schemas.microsoft.com/office/drawing/2014/main" id="{5B88AB3A-9955-EDBA-A9CD-9DF998961AB2}"/>
+              </a:ext>
+            </a:extLst>
+          </p:cNvPr>
+          <p:cNvSpPr txBox="1">
+            <a:spLocks/>
+          </p:cNvSpPr>
+          <p:nvPr/>
+        </p:nvSpPr>
+        <p:spPr>
+          <a:xfrm>
+            <a:off x="692613" y="1431809"/>
+            <a:ext cx="5986094" cy="826811"/>
+          </a:xfrm>
+          <a:prstGeom prst="rect">
+            <a:avLst/>
+          </a:prstGeom>
+        </p:spPr>
+        <p:txBody>
+          <a:bodyPr vert="horz" lIns="91440" tIns="45720" rIns="91440" bIns="45720" rtlCol="0" anchor="b">
+            <a:noAutofit/>
+          </a:bodyPr>
+          <a:lstStyle>
+            <a:lvl1pPr algn="l" defTabSz="914400" rtl="0" eaLnBrk="1" latinLnBrk="0" hangingPunct="1">
+              <a:lnSpc>
+                <a:spcPct val="90000"/>
+              </a:lnSpc>
+              <a:spcBef>
+                <a:spcPct val="0"/>
+              </a:spcBef>
+              <a:buNone/>
+              <a:defRPr sz="4800" kern="1200">
+                <a:solidFill>
+                  <a:schemeClr val="tx1"/>
+                </a:solidFill>
+                <a:latin typeface="+mj-lt"/>
+                <a:ea typeface="+mj-ea"/>
+                <a:cs typeface="+mj-cs"/>
+              </a:defRPr>
+            </a:lvl1pPr>
+          </a:lstStyle>
+          <a:p>
+            <a:r>
+              <a:rPr lang="en-US" altLang="zh-CN" sz="4400" dirty="0">
+                <a:latin typeface="华文隶书" panose="02010800040101010101" pitchFamily="2" charset="-122"/>
+                <a:ea typeface="华文隶书" panose="02010800040101010101" pitchFamily="2" charset="-122"/>
+                <a:cs typeface="ADLaM Display" panose="02010000000000000000" pitchFamily="2" charset="0"/>
+              </a:rPr>
+              <a:t>2.2.6 </a:t>
+            </a:r>
+            <a:r>
+              <a:rPr lang="zh-CN" altLang="en-US" sz="4400" dirty="0">
+                <a:latin typeface="华文隶书" panose="02010800040101010101" pitchFamily="2" charset="-122"/>
+                <a:ea typeface="华文隶书" panose="02010800040101010101" pitchFamily="2" charset="-122"/>
+                <a:cs typeface="ADLaM Display" panose="02010000000000000000" pitchFamily="2" charset="0"/>
+              </a:rPr>
+              <a:t>列表 </a:t>
+            </a:r>
+            <a:r>
+              <a:rPr lang="en-US" altLang="zh-CN" sz="4400" dirty="0">
+                <a:latin typeface="华文隶书" panose="02010800040101010101" pitchFamily="2" charset="-122"/>
+                <a:ea typeface="华文隶书" panose="02010800040101010101" pitchFamily="2" charset="-122"/>
+                <a:cs typeface="ADLaM Display" panose="02010000000000000000" pitchFamily="2" charset="0"/>
+              </a:rPr>
+              <a:t>List</a:t>
+            </a:r>
+            <a:endParaRPr lang="en-US" sz="4400" dirty="0">
+              <a:latin typeface="华文隶书" panose="02010800040101010101" pitchFamily="2" charset="-122"/>
+              <a:ea typeface="华文隶书" panose="02010800040101010101" pitchFamily="2" charset="-122"/>
+              <a:cs typeface="ADLaM Display" panose="02010000000000000000" pitchFamily="2" charset="0"/>
+            </a:endParaRPr>
+          </a:p>
+        </p:txBody>
+      </p:sp>
+      <p:pic>
+        <p:nvPicPr>
+          <p:cNvPr id="9" name="Picture 8">
+            <a:extLst>
+              <a:ext uri="{FF2B5EF4-FFF2-40B4-BE49-F238E27FC236}">
+                <a16:creationId xmlns:a16="http://schemas.microsoft.com/office/drawing/2014/main" id="{960D3452-F6A3-D4FC-9C32-769504A7D14E}"/>
+              </a:ext>
+            </a:extLst>
+          </p:cNvPr>
+          <p:cNvPicPr>
+            <a:picLocks noChangeAspect="1"/>
+          </p:cNvPicPr>
+          <p:nvPr/>
+        </p:nvPicPr>
+        <p:blipFill>
+          <a:blip r:embed="rId5"/>
+          <a:stretch>
+            <a:fillRect/>
+          </a:stretch>
+        </p:blipFill>
+        <p:spPr>
+          <a:xfrm>
+            <a:off x="4815244" y="1250254"/>
+            <a:ext cx="7138889" cy="4442334"/>
+          </a:xfrm>
+          <a:prstGeom prst="rect">
+            <a:avLst/>
+          </a:prstGeom>
+          <a:ln>
+            <a:noFill/>
+          </a:ln>
+          <a:effectLst>
+            <a:outerShdw blurRad="292100" dist="139700" dir="2700000" algn="tl" rotWithShape="0">
+              <a:srgbClr val="333333">
+                <a:alpha val="65000"/>
+              </a:srgbClr>
+            </a:outerShdw>
+          </a:effectLst>
+        </p:spPr>
+      </p:pic>
+      <p:sp>
+        <p:nvSpPr>
+          <p:cNvPr id="10" name="Rectangle 9">
+            <a:extLst>
+              <a:ext uri="{FF2B5EF4-FFF2-40B4-BE49-F238E27FC236}">
+                <a16:creationId xmlns:a16="http://schemas.microsoft.com/office/drawing/2014/main" id="{7CA6C830-F714-66E8-594C-81C44D12BD01}"/>
+              </a:ext>
+            </a:extLst>
+          </p:cNvPr>
+          <p:cNvSpPr/>
+          <p:nvPr/>
+        </p:nvSpPr>
+        <p:spPr>
+          <a:xfrm>
+            <a:off x="8211671" y="3615239"/>
+            <a:ext cx="3897350" cy="856130"/>
+          </a:xfrm>
+          <a:prstGeom prst="rect">
+            <a:avLst/>
+          </a:prstGeom>
+          <a:noFill/>
+          <a:ln w="38100">
+            <a:solidFill>
+              <a:srgbClr val="FF0000"/>
+            </a:solidFill>
+          </a:ln>
+        </p:spPr>
+        <p:style>
+          <a:lnRef idx="2">
+            <a:schemeClr val="accent1">
+              <a:shade val="15000"/>
+            </a:schemeClr>
+          </a:lnRef>
+          <a:fillRef idx="1">
+            <a:schemeClr val="accent1"/>
+          </a:fillRef>
+          <a:effectRef idx="0">
+            <a:schemeClr val="accent1"/>
+          </a:effectRef>
+          <a:fontRef idx="minor">
+            <a:schemeClr val="lt1"/>
+          </a:fontRef>
+        </p:style>
+        <p:txBody>
+          <a:bodyPr rtlCol="0" anchor="ctr"/>
+          <a:lstStyle/>
+          <a:p>
+            <a:pPr algn="ctr"/>
+            <a:endParaRPr lang="en-US"/>
+          </a:p>
+        </p:txBody>
+      </p:sp>
+    </p:spTree>
+    <p:extLst>
+      <p:ext uri="{BB962C8B-B14F-4D97-AF65-F5344CB8AC3E}">
+        <p14:creationId xmlns:p14="http://schemas.microsoft.com/office/powerpoint/2010/main" val="1100284391"/>
       </p:ext>
     </p:extLst>
   </p:cSld>
@@ -42850,6 +43709,36 @@
           <a:chExt cx="0" cy="0"/>
         </a:xfrm>
       </p:grpSpPr>
+      <p:pic>
+        <p:nvPicPr>
+          <p:cNvPr id="3" name="Picture 2">
+            <a:extLst>
+              <a:ext uri="{FF2B5EF4-FFF2-40B4-BE49-F238E27FC236}">
+                <a16:creationId xmlns:a16="http://schemas.microsoft.com/office/drawing/2014/main" id="{EFBD0FEC-AF34-63B9-5687-C5D2E382C910}"/>
+              </a:ext>
+            </a:extLst>
+          </p:cNvPr>
+          <p:cNvPicPr>
+            <a:picLocks noChangeAspect="1"/>
+          </p:cNvPicPr>
+          <p:nvPr/>
+        </p:nvPicPr>
+        <p:blipFill>
+          <a:blip r:embed="rId2"/>
+          <a:stretch>
+            <a:fillRect/>
+          </a:stretch>
+        </p:blipFill>
+        <p:spPr>
+          <a:xfrm>
+            <a:off x="756398" y="2243888"/>
+            <a:ext cx="6066636" cy="3536078"/>
+          </a:xfrm>
+          <a:prstGeom prst="rect">
+            <a:avLst/>
+          </a:prstGeom>
+        </p:spPr>
+      </p:pic>
       <p:sp>
         <p:nvSpPr>
           <p:cNvPr id="4" name="Title 3">
@@ -42932,7 +43821,7 @@
           </p:nvPr>
         </p:nvPicPr>
         <p:blipFill>
-          <a:blip r:embed="rId2"/>
+          <a:blip r:embed="rId3"/>
           <a:srcRect l="1435" r="1435"/>
           <a:stretch>
             <a:fillRect/>
@@ -43072,7 +43961,7 @@
             </a:r>
             <a:r>
               <a:rPr lang="en-US" sz="2800" b="1" dirty="0">
-                <a:hlinkClick r:id="rId3"/>
+                <a:hlinkClick r:id="rId4"/>
               </a:rPr>
               <a:t>https://github.com/yasenstar/learn_r/tree/main/RinAction</a:t>
             </a:r>
@@ -43085,7 +43974,7 @@
             </a:r>
             <a:r>
               <a:rPr lang="en-US" altLang="zh-CN" sz="2800" b="1" dirty="0">
-                <a:hlinkClick r:id="rId4"/>
+                <a:hlinkClick r:id="rId5"/>
               </a:rPr>
               <a:t>https://gitee.com/yasenstar/learn_r/tree/main/RinAction</a:t>
             </a:r>
@@ -43178,8 +44067,8 @@
         </p:nvSpPr>
         <p:spPr>
           <a:xfrm>
-            <a:off x="2319564" y="2457419"/>
-            <a:ext cx="4428563" cy="2213682"/>
+            <a:off x="1900518" y="3429000"/>
+            <a:ext cx="4847609" cy="856130"/>
           </a:xfrm>
           <a:prstGeom prst="rect">
             <a:avLst/>
@@ -43220,6 +44109,420 @@
     <p:extLst>
       <p:ext uri="{BB962C8B-B14F-4D97-AF65-F5344CB8AC3E}">
         <p14:creationId xmlns:p14="http://schemas.microsoft.com/office/powerpoint/2010/main" val="1854457490"/>
+      </p:ext>
+    </p:extLst>
+  </p:cSld>
+  <p:clrMapOvr>
+    <a:masterClrMapping/>
+  </p:clrMapOvr>
+</p:sld>
+</file>
+
+<file path=ppt/slides/slide9.xml><?xml version="1.0" encoding="utf-8"?>
+<p:sld xmlns:a="http://schemas.openxmlformats.org/drawingml/2006/main" xmlns:r="http://schemas.openxmlformats.org/officeDocument/2006/relationships" xmlns:p="http://schemas.openxmlformats.org/presentationml/2006/main">
+  <p:cSld>
+    <p:spTree>
+      <p:nvGrpSpPr>
+        <p:cNvPr id="1" name="">
+          <a:extLst>
+            <a:ext uri="{FF2B5EF4-FFF2-40B4-BE49-F238E27FC236}">
+              <a16:creationId xmlns:a16="http://schemas.microsoft.com/office/drawing/2014/main" id="{A31D9B2A-7D18-1240-8B48-E0FB5CDAE635}"/>
+            </a:ext>
+          </a:extLst>
+        </p:cNvPr>
+        <p:cNvGrpSpPr/>
+        <p:nvPr/>
+      </p:nvGrpSpPr>
+      <p:grpSpPr>
+        <a:xfrm>
+          <a:off x="0" y="0"/>
+          <a:ext cx="0" cy="0"/>
+          <a:chOff x="0" y="0"/>
+          <a:chExt cx="0" cy="0"/>
+        </a:xfrm>
+      </p:grpSpPr>
+      <p:sp>
+        <p:nvSpPr>
+          <p:cNvPr id="4" name="Title 3">
+            <a:extLst>
+              <a:ext uri="{FF2B5EF4-FFF2-40B4-BE49-F238E27FC236}">
+                <a16:creationId xmlns:a16="http://schemas.microsoft.com/office/drawing/2014/main" id="{6E9F5485-82ED-191F-CE4B-5C7936EA29AB}"/>
+              </a:ext>
+            </a:extLst>
+          </p:cNvPr>
+          <p:cNvSpPr>
+            <a:spLocks noGrp="1"/>
+          </p:cNvSpPr>
+          <p:nvPr>
+            <p:ph type="title"/>
+          </p:nvPr>
+        </p:nvSpPr>
+        <p:spPr>
+          <a:xfrm>
+            <a:off x="576071" y="704087"/>
+            <a:ext cx="6757058" cy="826811"/>
+          </a:xfrm>
+        </p:spPr>
+        <p:txBody>
+          <a:bodyPr/>
+          <a:lstStyle/>
+          <a:p>
+            <a:r>
+              <a:rPr lang="en-US" sz="6000" dirty="0">
+                <a:latin typeface="ADLaM Display" panose="02010000000000000000" pitchFamily="2" charset="0"/>
+                <a:ea typeface="ADLaM Display" panose="02010000000000000000" pitchFamily="2" charset="0"/>
+                <a:cs typeface="ADLaM Display" panose="02010000000000000000" pitchFamily="2" charset="0"/>
+              </a:rPr>
+              <a:t>009</a:t>
+            </a:r>
+            <a:r>
+              <a:rPr lang="en-US" dirty="0">
+                <a:latin typeface="ADLaM Display" panose="02010000000000000000" pitchFamily="2" charset="0"/>
+                <a:ea typeface="ADLaM Display" panose="02010000000000000000" pitchFamily="2" charset="0"/>
+                <a:cs typeface="ADLaM Display" panose="02010000000000000000" pitchFamily="2" charset="0"/>
+              </a:rPr>
+              <a:t> </a:t>
+            </a:r>
+            <a:br>
+              <a:rPr lang="en-US" dirty="0">
+                <a:latin typeface="ADLaM Display" panose="02010000000000000000" pitchFamily="2" charset="0"/>
+                <a:ea typeface="ADLaM Display" panose="02010000000000000000" pitchFamily="2" charset="0"/>
+                <a:cs typeface="ADLaM Display" panose="02010000000000000000" pitchFamily="2" charset="0"/>
+              </a:rPr>
+            </a:br>
+            <a:r>
+              <a:rPr lang="en-US" dirty="0">
+                <a:latin typeface="ADLaM Display" panose="02010000000000000000" pitchFamily="2" charset="0"/>
+                <a:ea typeface="ADLaM Display" panose="02010000000000000000" pitchFamily="2" charset="0"/>
+                <a:cs typeface="ADLaM Display" panose="02010000000000000000" pitchFamily="2" charset="0"/>
+              </a:rPr>
+              <a:t>2. </a:t>
+            </a:r>
+            <a:r>
+              <a:rPr lang="zh-CN" altLang="en-US" dirty="0">
+                <a:latin typeface="华文隶书" panose="02010800040101010101" pitchFamily="2" charset="-122"/>
+                <a:ea typeface="华文隶书" panose="02010800040101010101" pitchFamily="2" charset="-122"/>
+                <a:cs typeface="ADLaM Display" panose="02010000000000000000" pitchFamily="2" charset="0"/>
+              </a:rPr>
+              <a:t>创建数据集</a:t>
+            </a:r>
+            <a:endParaRPr lang="en-US" dirty="0">
+              <a:latin typeface="华文隶书" panose="02010800040101010101" pitchFamily="2" charset="-122"/>
+              <a:ea typeface="华文隶书" panose="02010800040101010101" pitchFamily="2" charset="-122"/>
+              <a:cs typeface="ADLaM Display" panose="02010000000000000000" pitchFamily="2" charset="0"/>
+            </a:endParaRPr>
+          </a:p>
+        </p:txBody>
+      </p:sp>
+      <p:pic>
+        <p:nvPicPr>
+          <p:cNvPr id="8" name="Picture Placeholder 7" descr="A book with a person in a garment">
+            <a:extLst>
+              <a:ext uri="{FF2B5EF4-FFF2-40B4-BE49-F238E27FC236}">
+                <a16:creationId xmlns:a16="http://schemas.microsoft.com/office/drawing/2014/main" id="{AA0D6022-7F78-2318-E545-EAB85E6BC3B5}"/>
+              </a:ext>
+            </a:extLst>
+          </p:cNvPr>
+          <p:cNvPicPr>
+            <a:picLocks noGrp="1" noChangeAspect="1"/>
+          </p:cNvPicPr>
+          <p:nvPr>
+            <p:ph type="pic" idx="1"/>
+          </p:nvPr>
+        </p:nvPicPr>
+        <p:blipFill>
+          <a:blip r:embed="rId2"/>
+          <a:srcRect l="1435" r="1435"/>
+          <a:stretch>
+            <a:fillRect/>
+          </a:stretch>
+        </p:blipFill>
+        <p:spPr>
+          <a:xfrm>
+            <a:off x="7492198" y="1145663"/>
+            <a:ext cx="3320846" cy="4566673"/>
+          </a:xfrm>
+          <a:prstGeom prst="roundRect">
+            <a:avLst>
+              <a:gd name="adj" fmla="val 8594"/>
+            </a:avLst>
+          </a:prstGeom>
+          <a:solidFill>
+            <a:srgbClr val="FFFFFF">
+              <a:shade val="85000"/>
+            </a:srgbClr>
+          </a:solidFill>
+          <a:ln>
+            <a:noFill/>
+          </a:ln>
+          <a:effectLst>
+            <a:reflection blurRad="12700" stA="38000" endPos="28000" dist="5000" dir="5400000" sy="-100000" algn="bl" rotWithShape="0"/>
+          </a:effectLst>
+        </p:spPr>
+      </p:pic>
+      <p:sp>
+        <p:nvSpPr>
+          <p:cNvPr id="11" name="Title 1">
+            <a:extLst>
+              <a:ext uri="{FF2B5EF4-FFF2-40B4-BE49-F238E27FC236}">
+                <a16:creationId xmlns:a16="http://schemas.microsoft.com/office/drawing/2014/main" id="{49C53002-6FC8-F7E8-A323-2CFA63A18A30}"/>
+              </a:ext>
+            </a:extLst>
+          </p:cNvPr>
+          <p:cNvSpPr txBox="1">
+            <a:spLocks/>
+          </p:cNvSpPr>
+          <p:nvPr/>
+        </p:nvSpPr>
+        <p:spPr>
+          <a:xfrm>
+            <a:off x="7492198" y="267855"/>
+            <a:ext cx="3320846" cy="877808"/>
+          </a:xfrm>
+          <a:prstGeom prst="rect">
+            <a:avLst/>
+          </a:prstGeom>
+        </p:spPr>
+        <p:txBody>
+          <a:bodyPr vert="horz" lIns="91440" tIns="45720" rIns="91440" bIns="45720" rtlCol="0" anchor="b">
+            <a:noAutofit/>
+          </a:bodyPr>
+          <a:lstStyle>
+            <a:lvl1pPr algn="l" defTabSz="914400" rtl="0" eaLnBrk="1" latinLnBrk="0" hangingPunct="1">
+              <a:lnSpc>
+                <a:spcPct val="90000"/>
+              </a:lnSpc>
+              <a:spcBef>
+                <a:spcPct val="0"/>
+              </a:spcBef>
+              <a:buNone/>
+              <a:defRPr sz="4800" kern="1200">
+                <a:solidFill>
+                  <a:schemeClr val="tx1"/>
+                </a:solidFill>
+                <a:latin typeface="+mj-lt"/>
+                <a:ea typeface="+mj-ea"/>
+                <a:cs typeface="+mj-cs"/>
+              </a:defRPr>
+            </a:lvl1pPr>
+          </a:lstStyle>
+          <a:p>
+            <a:pPr algn="ctr"/>
+            <a:r>
+              <a:rPr lang="en-US" sz="4000" dirty="0">
+                <a:latin typeface="ADLaM Display" panose="02010000000000000000" pitchFamily="2" charset="0"/>
+                <a:ea typeface="ADLaM Display" panose="02010000000000000000" pitchFamily="2" charset="0"/>
+                <a:cs typeface="ADLaM Display" panose="02010000000000000000" pitchFamily="2" charset="0"/>
+              </a:rPr>
+              <a:t>R in Action</a:t>
+            </a:r>
+            <a:br>
+              <a:rPr lang="en-US" sz="4000" dirty="0"/>
+            </a:br>
+            <a:r>
+              <a:rPr lang="en-US" altLang="zh-CN" sz="4000" dirty="0"/>
+              <a:t>R</a:t>
+            </a:r>
+            <a:r>
+              <a:rPr lang="zh-CN" altLang="en-US" sz="4000" dirty="0">
+                <a:latin typeface="华文隶书" panose="02010800040101010101" pitchFamily="2" charset="-122"/>
+                <a:ea typeface="华文隶书" panose="02010800040101010101" pitchFamily="2" charset="-122"/>
+              </a:rPr>
+              <a:t>语言实战</a:t>
+            </a:r>
+            <a:endParaRPr lang="en-US" sz="4000" dirty="0">
+              <a:latin typeface="华文隶书" panose="02010800040101010101" pitchFamily="2" charset="-122"/>
+              <a:ea typeface="华文隶书" panose="02010800040101010101" pitchFamily="2" charset="-122"/>
+            </a:endParaRPr>
+          </a:p>
+        </p:txBody>
+      </p:sp>
+      <p:sp>
+        <p:nvSpPr>
+          <p:cNvPr id="13" name="TextBox 12">
+            <a:extLst>
+              <a:ext uri="{FF2B5EF4-FFF2-40B4-BE49-F238E27FC236}">
+                <a16:creationId xmlns:a16="http://schemas.microsoft.com/office/drawing/2014/main" id="{A0D8160E-528F-EBE9-6709-E768D4318C4C}"/>
+              </a:ext>
+            </a:extLst>
+          </p:cNvPr>
+          <p:cNvSpPr txBox="1"/>
+          <p:nvPr/>
+        </p:nvSpPr>
+        <p:spPr>
+          <a:xfrm>
+            <a:off x="942109" y="5836954"/>
+            <a:ext cx="10510982" cy="954107"/>
+          </a:xfrm>
+          <a:prstGeom prst="rect">
+            <a:avLst/>
+          </a:prstGeom>
+          <a:noFill/>
+        </p:spPr>
+        <p:txBody>
+          <a:bodyPr wrap="square">
+            <a:spAutoFit/>
+          </a:bodyPr>
+          <a:lstStyle/>
+          <a:p>
+            <a:r>
+              <a:rPr lang="en-US" sz="2800" b="1" dirty="0"/>
+              <a:t>GitHub: </a:t>
+            </a:r>
+            <a:r>
+              <a:rPr lang="en-US" sz="2800" b="1" dirty="0">
+                <a:hlinkClick r:id="rId3"/>
+              </a:rPr>
+              <a:t>https://github.com/yasenstar/learn_r/tree/main/RinAction</a:t>
+            </a:r>
+            <a:endParaRPr lang="en-US" sz="2800" b="1" dirty="0"/>
+          </a:p>
+          <a:p>
+            <a:r>
+              <a:rPr lang="en-US" altLang="zh-CN" sz="2800" b="1" dirty="0"/>
+              <a:t>Gitee: </a:t>
+            </a:r>
+            <a:r>
+              <a:rPr lang="en-US" altLang="zh-CN" sz="2800" b="1" dirty="0">
+                <a:hlinkClick r:id="rId4"/>
+              </a:rPr>
+              <a:t>https://gitee.com/yasenstar/learn_r/tree/main/RinAction</a:t>
+            </a:r>
+            <a:endParaRPr lang="en-US" sz="2800" b="1" dirty="0"/>
+          </a:p>
+        </p:txBody>
+      </p:sp>
+      <p:sp>
+        <p:nvSpPr>
+          <p:cNvPr id="7" name="Title 1">
+            <a:extLst>
+              <a:ext uri="{FF2B5EF4-FFF2-40B4-BE49-F238E27FC236}">
+                <a16:creationId xmlns:a16="http://schemas.microsoft.com/office/drawing/2014/main" id="{73BDD91E-7680-13DF-04D7-4536D1170992}"/>
+              </a:ext>
+            </a:extLst>
+          </p:cNvPr>
+          <p:cNvSpPr txBox="1">
+            <a:spLocks/>
+          </p:cNvSpPr>
+          <p:nvPr/>
+        </p:nvSpPr>
+        <p:spPr>
+          <a:xfrm>
+            <a:off x="692613" y="1360089"/>
+            <a:ext cx="5986094" cy="826811"/>
+          </a:xfrm>
+          <a:prstGeom prst="rect">
+            <a:avLst/>
+          </a:prstGeom>
+        </p:spPr>
+        <p:txBody>
+          <a:bodyPr vert="horz" lIns="91440" tIns="45720" rIns="91440" bIns="45720" rtlCol="0" anchor="b">
+            <a:noAutofit/>
+          </a:bodyPr>
+          <a:lstStyle>
+            <a:lvl1pPr algn="l" defTabSz="914400" rtl="0" eaLnBrk="1" latinLnBrk="0" hangingPunct="1">
+              <a:lnSpc>
+                <a:spcPct val="90000"/>
+              </a:lnSpc>
+              <a:spcBef>
+                <a:spcPct val="0"/>
+              </a:spcBef>
+              <a:buNone/>
+              <a:defRPr sz="4800" kern="1200">
+                <a:solidFill>
+                  <a:schemeClr val="tx1"/>
+                </a:solidFill>
+                <a:latin typeface="+mj-lt"/>
+                <a:ea typeface="+mj-ea"/>
+                <a:cs typeface="+mj-cs"/>
+              </a:defRPr>
+            </a:lvl1pPr>
+          </a:lstStyle>
+          <a:p>
+            <a:r>
+              <a:rPr lang="en-US" altLang="zh-CN" sz="4400" dirty="0">
+                <a:latin typeface="华文隶书" panose="02010800040101010101" pitchFamily="2" charset="-122"/>
+                <a:ea typeface="华文隶书" panose="02010800040101010101" pitchFamily="2" charset="-122"/>
+                <a:cs typeface="ADLaM Display" panose="02010000000000000000" pitchFamily="2" charset="0"/>
+              </a:rPr>
+              <a:t>2.2.3 </a:t>
+            </a:r>
+            <a:r>
+              <a:rPr lang="zh-CN" altLang="en-US" sz="4400" dirty="0">
+                <a:latin typeface="华文隶书" panose="02010800040101010101" pitchFamily="2" charset="-122"/>
+                <a:ea typeface="华文隶书" panose="02010800040101010101" pitchFamily="2" charset="-122"/>
+                <a:cs typeface="ADLaM Display" panose="02010000000000000000" pitchFamily="2" charset="0"/>
+              </a:rPr>
+              <a:t>数组  </a:t>
+            </a:r>
+            <a:r>
+              <a:rPr lang="en-US" altLang="zh-CN" sz="4400" dirty="0">
+                <a:latin typeface="华文隶书" panose="02010800040101010101" pitchFamily="2" charset="-122"/>
+                <a:ea typeface="华文隶书" panose="02010800040101010101" pitchFamily="2" charset="-122"/>
+                <a:cs typeface="ADLaM Display" panose="02010000000000000000" pitchFamily="2" charset="0"/>
+              </a:rPr>
+              <a:t>2.2.4 </a:t>
+            </a:r>
+            <a:r>
+              <a:rPr lang="zh-CN" altLang="en-US" sz="4400" dirty="0">
+                <a:latin typeface="华文隶书" panose="02010800040101010101" pitchFamily="2" charset="-122"/>
+                <a:ea typeface="华文隶书" panose="02010800040101010101" pitchFamily="2" charset="-122"/>
+                <a:cs typeface="ADLaM Display" panose="02010000000000000000" pitchFamily="2" charset="0"/>
+              </a:rPr>
+              <a:t>数据框</a:t>
+            </a:r>
+            <a:endParaRPr lang="en-US" sz="4400" dirty="0">
+              <a:latin typeface="华文隶书" panose="02010800040101010101" pitchFamily="2" charset="-122"/>
+              <a:ea typeface="华文隶书" panose="02010800040101010101" pitchFamily="2" charset="-122"/>
+              <a:cs typeface="ADLaM Display" panose="02010000000000000000" pitchFamily="2" charset="0"/>
+            </a:endParaRPr>
+          </a:p>
+        </p:txBody>
+      </p:sp>
+      <p:pic>
+        <p:nvPicPr>
+          <p:cNvPr id="6" name="Picture 5">
+            <a:extLst>
+              <a:ext uri="{FF2B5EF4-FFF2-40B4-BE49-F238E27FC236}">
+                <a16:creationId xmlns:a16="http://schemas.microsoft.com/office/drawing/2014/main" id="{CB1E4ACF-C37C-BE61-7C1E-CC08FDD91EE0}"/>
+              </a:ext>
+            </a:extLst>
+          </p:cNvPr>
+          <p:cNvPicPr>
+            <a:picLocks noChangeAspect="1"/>
+          </p:cNvPicPr>
+          <p:nvPr/>
+        </p:nvPicPr>
+        <p:blipFill>
+          <a:blip r:embed="rId5"/>
+          <a:stretch>
+            <a:fillRect/>
+          </a:stretch>
+        </p:blipFill>
+        <p:spPr>
+          <a:xfrm>
+            <a:off x="942109" y="2082434"/>
+            <a:ext cx="5281639" cy="3692211"/>
+          </a:xfrm>
+          <a:prstGeom prst="rect">
+            <a:avLst/>
+          </a:prstGeom>
+          <a:ln>
+            <a:noFill/>
+          </a:ln>
+          <a:effectLst>
+            <a:outerShdw blurRad="292100" dist="139700" dir="2700000" algn="tl" rotWithShape="0">
+              <a:srgbClr val="333333">
+                <a:alpha val="65000"/>
+              </a:srgbClr>
+            </a:outerShdw>
+          </a:effectLst>
+        </p:spPr>
+      </p:pic>
+    </p:spTree>
+    <p:extLst>
+      <p:ext uri="{BB962C8B-B14F-4D97-AF65-F5344CB8AC3E}">
+        <p14:creationId xmlns:p14="http://schemas.microsoft.com/office/powerpoint/2010/main" val="663635123"/>
       </p:ext>
     </p:extLst>
   </p:cSld>
@@ -44021,35 +45324,6 @@
 </file>
 
 <file path=customXml/item1.xml><?xml version="1.0" encoding="utf-8"?>
-<?mso-contentType ?>
-<FormTemplates xmlns="http://schemas.microsoft.com/sharepoint/v3/contenttype/forms">
-  <Display>DocumentLibraryForm</Display>
-  <Edit>DocumentLibraryForm</Edit>
-  <New>DocumentLibraryForm</New>
-</FormTemplates>
-</file>
-
-<file path=customXml/item2.xml><?xml version="1.0" encoding="utf-8"?>
-<p:properties xmlns:p="http://schemas.microsoft.com/office/2006/metadata/properties" xmlns:xsi="http://www.w3.org/2001/XMLSchema-instance" xmlns:pc="http://schemas.microsoft.com/office/infopath/2007/PartnerControls">
-  <documentManagement>
-    <_ip_UnifiedCompliancePolicyUIAction xmlns="http://schemas.microsoft.com/sharepoint/v3" xsi:nil="true"/>
-    <Image xmlns="71af3243-3dd4-4a8d-8c0d-dd76da1f02a5">
-      <Url xsi:nil="true"/>
-      <Description xsi:nil="true"/>
-    </Image>
-    <Status xmlns="71af3243-3dd4-4a8d-8c0d-dd76da1f02a5">Not started</Status>
-    <Background xmlns="71af3243-3dd4-4a8d-8c0d-dd76da1f02a5">false</Background>
-    <_ip_UnifiedCompliancePolicyProperties xmlns="http://schemas.microsoft.com/sharepoint/v3" xsi:nil="true"/>
-    <ImageTagsTaxHTField xmlns="71af3243-3dd4-4a8d-8c0d-dd76da1f02a5">
-      <Terms xmlns="http://schemas.microsoft.com/office/infopath/2007/PartnerControls"/>
-    </ImageTagsTaxHTField>
-    <TaxCatchAll xmlns="230e9df3-be65-4c73-a93b-d1236ebd677e" xsi:nil="true"/>
-    <MediaServiceKeyPoints xmlns="71af3243-3dd4-4a8d-8c0d-dd76da1f02a5" xsi:nil="true"/>
-  </documentManagement>
-</p:properties>
-</file>
-
-<file path=customXml/item3.xml><?xml version="1.0" encoding="utf-8"?>
 <ct:contentTypeSchema xmlns:ct="http://schemas.microsoft.com/office/2006/metadata/contentType" xmlns:ma="http://schemas.microsoft.com/office/2006/metadata/properties/metaAttributes" ct:_="" ma:_="" ma:contentTypeName="Document" ma:contentTypeID="0x01010079F111ED35F8CC479449609E8A0923A6" ma:contentTypeVersion="28" ma:contentTypeDescription="Create a new document." ma:contentTypeScope="" ma:versionID="60f5a4f2d2b0abadcf532d48ebf9cb71">
   <xsd:schema xmlns:xsd="http://www.w3.org/2001/XMLSchema" xmlns:xs="http://www.w3.org/2001/XMLSchema" xmlns:p="http://schemas.microsoft.com/office/2006/metadata/properties" xmlns:ns1="http://schemas.microsoft.com/sharepoint/v3" xmlns:ns2="71af3243-3dd4-4a8d-8c0d-dd76da1f02a5" xmlns:ns3="16c05727-aa75-4e4a-9b5f-8a80a1165891" xmlns:ns4="230e9df3-be65-4c73-a93b-d1236ebd677e" targetNamespace="http://schemas.microsoft.com/office/2006/metadata/properties" ma:root="true" ma:fieldsID="7dd78129e6a1811f84807ad11c651531" ns1:_="" ns2:_="" ns3:_="" ns4:_="">
     <xsd:import namespace="http://schemas.microsoft.com/sharepoint/v3"/>
@@ -44361,27 +45635,36 @@
 </ct:contentTypeSchema>
 </file>
 
-<file path=customXml/itemProps1.xml><?xml version="1.0" encoding="utf-8"?>
-<ds:datastoreItem xmlns:ds="http://schemas.openxmlformats.org/officeDocument/2006/customXml" ds:itemID="{1EE26AC2-BC04-45BA-BD7C-5CDF09AA9426}">
-  <ds:schemaRefs>
-    <ds:schemaRef ds:uri="http://schemas.microsoft.com/sharepoint/v3/contenttype/forms"/>
-  </ds:schemaRefs>
-</ds:datastoreItem>
+<file path=customXml/item2.xml><?xml version="1.0" encoding="utf-8"?>
+<p:properties xmlns:p="http://schemas.microsoft.com/office/2006/metadata/properties" xmlns:xsi="http://www.w3.org/2001/XMLSchema-instance" xmlns:pc="http://schemas.microsoft.com/office/infopath/2007/PartnerControls">
+  <documentManagement>
+    <_ip_UnifiedCompliancePolicyUIAction xmlns="http://schemas.microsoft.com/sharepoint/v3" xsi:nil="true"/>
+    <Image xmlns="71af3243-3dd4-4a8d-8c0d-dd76da1f02a5">
+      <Url xsi:nil="true"/>
+      <Description xsi:nil="true"/>
+    </Image>
+    <Status xmlns="71af3243-3dd4-4a8d-8c0d-dd76da1f02a5">Not started</Status>
+    <Background xmlns="71af3243-3dd4-4a8d-8c0d-dd76da1f02a5">false</Background>
+    <_ip_UnifiedCompliancePolicyProperties xmlns="http://schemas.microsoft.com/sharepoint/v3" xsi:nil="true"/>
+    <ImageTagsTaxHTField xmlns="71af3243-3dd4-4a8d-8c0d-dd76da1f02a5">
+      <Terms xmlns="http://schemas.microsoft.com/office/infopath/2007/PartnerControls"/>
+    </ImageTagsTaxHTField>
+    <TaxCatchAll xmlns="230e9df3-be65-4c73-a93b-d1236ebd677e" xsi:nil="true"/>
+    <MediaServiceKeyPoints xmlns="71af3243-3dd4-4a8d-8c0d-dd76da1f02a5" xsi:nil="true"/>
+  </documentManagement>
+</p:properties>
 </file>
 
-<file path=customXml/itemProps2.xml><?xml version="1.0" encoding="utf-8"?>
-<ds:datastoreItem xmlns:ds="http://schemas.openxmlformats.org/officeDocument/2006/customXml" ds:itemID="{C7AE7813-FB42-416C-BEF8-5F3180DDB0F6}">
-  <ds:schemaRefs>
-    <ds:schemaRef ds:uri="http://schemas.microsoft.com/office/2006/metadata/properties"/>
-    <ds:schemaRef ds:uri="http://schemas.microsoft.com/office/infopath/2007/PartnerControls"/>
-    <ds:schemaRef ds:uri="http://schemas.microsoft.com/sharepoint/v3"/>
-    <ds:schemaRef ds:uri="71af3243-3dd4-4a8d-8c0d-dd76da1f02a5"/>
-    <ds:schemaRef ds:uri="230e9df3-be65-4c73-a93b-d1236ebd677e"/>
-  </ds:schemaRefs>
-</ds:datastoreItem>
+<file path=customXml/item3.xml><?xml version="1.0" encoding="utf-8"?>
+<?mso-contentType ?>
+<FormTemplates xmlns="http://schemas.microsoft.com/sharepoint/v3/contenttype/forms">
+  <Display>DocumentLibraryForm</Display>
+  <Edit>DocumentLibraryForm</Edit>
+  <New>DocumentLibraryForm</New>
+</FormTemplates>
 </file>
 
-<file path=customXml/itemProps3.xml><?xml version="1.0" encoding="utf-8"?>
+<file path=customXml/itemProps1.xml><?xml version="1.0" encoding="utf-8"?>
 <ds:datastoreItem xmlns:ds="http://schemas.openxmlformats.org/officeDocument/2006/customXml" ds:itemID="{18840F3C-8AB4-4243-A06A-B5999EF60028}">
   <ds:schemaRefs>
     <ds:schemaRef ds:uri="http://schemas.microsoft.com/office/2006/metadata/contentType"/>
@@ -44402,6 +45685,26 @@
 </ds:datastoreItem>
 </file>
 
+<file path=customXml/itemProps2.xml><?xml version="1.0" encoding="utf-8"?>
+<ds:datastoreItem xmlns:ds="http://schemas.openxmlformats.org/officeDocument/2006/customXml" ds:itemID="{C7AE7813-FB42-416C-BEF8-5F3180DDB0F6}">
+  <ds:schemaRefs>
+    <ds:schemaRef ds:uri="http://schemas.microsoft.com/office/2006/metadata/properties"/>
+    <ds:schemaRef ds:uri="http://schemas.microsoft.com/office/infopath/2007/PartnerControls"/>
+    <ds:schemaRef ds:uri="http://schemas.microsoft.com/sharepoint/v3"/>
+    <ds:schemaRef ds:uri="71af3243-3dd4-4a8d-8c0d-dd76da1f02a5"/>
+    <ds:schemaRef ds:uri="230e9df3-be65-4c73-a93b-d1236ebd677e"/>
+  </ds:schemaRefs>
+</ds:datastoreItem>
+</file>
+
+<file path=customXml/itemProps3.xml><?xml version="1.0" encoding="utf-8"?>
+<ds:datastoreItem xmlns:ds="http://schemas.openxmlformats.org/officeDocument/2006/customXml" ds:itemID="{1EE26AC2-BC04-45BA-BD7C-5CDF09AA9426}">
+  <ds:schemaRefs>
+    <ds:schemaRef ds:uri="http://schemas.microsoft.com/sharepoint/v3/contenttype/forms"/>
+  </ds:schemaRefs>
+</ds:datastoreItem>
+</file>
+
 <file path=docMetadata/LabelInfo.xml><?xml version="1.0" encoding="utf-8"?>
 <clbl:labelList xmlns:clbl="http://schemas.microsoft.com/office/2020/mipLabelMetadata"/>
 </file>
</xml_diff>